<commit_message>
Update Présentation projet de Génie Logiciel.pptx
</commit_message>
<xml_diff>
--- a/Présentation projet de Génie Logiciel.pptx
+++ b/Présentation projet de Génie Logiciel.pptx
@@ -6,10 +6,14 @@
   </p:sldMasterIdLst>
   <p:sldIdLst>
     <p:sldId id="256" r:id="rId2"/>
-    <p:sldId id="258" r:id="rId3"/>
-    <p:sldId id="259" r:id="rId4"/>
-    <p:sldId id="260" r:id="rId5"/>
-    <p:sldId id="261" r:id="rId6"/>
+    <p:sldId id="262" r:id="rId3"/>
+    <p:sldId id="258" r:id="rId4"/>
+    <p:sldId id="259" r:id="rId5"/>
+    <p:sldId id="260" r:id="rId6"/>
+    <p:sldId id="261" r:id="rId7"/>
+    <p:sldId id="263" r:id="rId8"/>
+    <p:sldId id="264" r:id="rId9"/>
+    <p:sldId id="265" r:id="rId10"/>
   </p:sldIdLst>
   <p:sldSz cx="12192000" cy="6858000"/>
   <p:notesSz cx="6858000" cy="9144000"/>
@@ -108,6 +112,11 @@
       </a:defRPr>
     </a:lvl9pPr>
   </p:defaultTextStyle>
+  <p:extLst>
+    <p:ext uri="{EFAFB233-063F-42B5-8137-9DF3F51BA10A}">
+      <p15:sldGuideLst xmlns:p15="http://schemas.microsoft.com/office/powerpoint/2012/main"/>
+    </p:ext>
+  </p:extLst>
 </p:presentation>
 </file>
 
@@ -6147,12 +6156,6 @@
           <a:p>
             <a:r>
               <a:rPr lang="fr-FR" dirty="0"/>
-              <a:t>Système de gestion de commande de plats</a:t>
-            </a:r>
-          </a:p>
-          <a:p>
-            <a:r>
-              <a:rPr lang="fr-FR" dirty="0"/>
               <a:t>GUILLAUME PERRON, ADRIEN FÉRÉ</a:t>
             </a:r>
             <a:endParaRPr lang="fr-NC" dirty="0"/>
@@ -6173,6 +6176,115 @@
 </file>
 
 <file path=ppt/slides/slide2.xml><?xml version="1.0" encoding="utf-8"?>
+<p:sld xmlns:a="http://schemas.openxmlformats.org/drawingml/2006/main" xmlns:r="http://schemas.openxmlformats.org/officeDocument/2006/relationships" xmlns:p="http://schemas.openxmlformats.org/presentationml/2006/main">
+  <p:cSld>
+    <p:spTree>
+      <p:nvGrpSpPr>
+        <p:cNvPr id="1" name=""/>
+        <p:cNvGrpSpPr/>
+        <p:nvPr/>
+      </p:nvGrpSpPr>
+      <p:grpSpPr>
+        <a:xfrm>
+          <a:off x="0" y="0"/>
+          <a:ext cx="0" cy="0"/>
+          <a:chOff x="0" y="0"/>
+          <a:chExt cx="0" cy="0"/>
+        </a:xfrm>
+      </p:grpSpPr>
+      <p:sp>
+        <p:nvSpPr>
+          <p:cNvPr id="2" name="Titre 1">
+            <a:extLst>
+              <a:ext uri="{FF2B5EF4-FFF2-40B4-BE49-F238E27FC236}">
+                <a16:creationId xmlns:a16="http://schemas.microsoft.com/office/drawing/2014/main" id="{BCE43974-E9C9-CF0D-C3B5-97225F9AFE29}"/>
+              </a:ext>
+            </a:extLst>
+          </p:cNvPr>
+          <p:cNvSpPr>
+            <a:spLocks noGrp="1"/>
+          </p:cNvSpPr>
+          <p:nvPr>
+            <p:ph type="title"/>
+          </p:nvPr>
+        </p:nvSpPr>
+        <p:spPr/>
+        <p:txBody>
+          <a:bodyPr/>
+          <a:lstStyle/>
+          <a:p>
+            <a:r>
+              <a:rPr lang="fr-FR" dirty="0"/>
+              <a:t>CONTEXTE</a:t>
+            </a:r>
+            <a:endParaRPr lang="fr-NC" dirty="0"/>
+          </a:p>
+        </p:txBody>
+      </p:sp>
+      <p:sp>
+        <p:nvSpPr>
+          <p:cNvPr id="3" name="Espace réservé du contenu 2">
+            <a:extLst>
+              <a:ext uri="{FF2B5EF4-FFF2-40B4-BE49-F238E27FC236}">
+                <a16:creationId xmlns:a16="http://schemas.microsoft.com/office/drawing/2014/main" id="{5CB013A8-918F-B7BB-7549-539A4FEB47CD}"/>
+              </a:ext>
+            </a:extLst>
+          </p:cNvPr>
+          <p:cNvSpPr>
+            <a:spLocks noGrp="1"/>
+          </p:cNvSpPr>
+          <p:nvPr>
+            <p:ph idx="1"/>
+          </p:nvPr>
+        </p:nvSpPr>
+        <p:spPr/>
+        <p:txBody>
+          <a:bodyPr/>
+          <a:lstStyle/>
+          <a:p>
+            <a:r>
+              <a:rPr lang="fr-FR" dirty="0"/>
+              <a:t>Application de commande d’un restaurant.</a:t>
+            </a:r>
+          </a:p>
+          <a:p>
+            <a:pPr lvl="1"/>
+            <a:r>
+              <a:rPr lang="fr-FR" dirty="0"/>
+              <a:t>Affichage d’un menu</a:t>
+            </a:r>
+          </a:p>
+          <a:p>
+            <a:pPr lvl="1"/>
+            <a:r>
+              <a:rPr lang="fr-FR" dirty="0"/>
+              <a:t>Création et modification de commandes</a:t>
+            </a:r>
+          </a:p>
+          <a:p>
+            <a:pPr lvl="1"/>
+            <a:r>
+              <a:rPr lang="fr-FR" dirty="0"/>
+              <a:t>Affichage du détail de la commande</a:t>
+            </a:r>
+            <a:endParaRPr lang="fr-NC" dirty="0"/>
+          </a:p>
+        </p:txBody>
+      </p:sp>
+    </p:spTree>
+    <p:extLst>
+      <p:ext uri="{BB962C8B-B14F-4D97-AF65-F5344CB8AC3E}">
+        <p14:creationId xmlns:p14="http://schemas.microsoft.com/office/powerpoint/2010/main" val="1782878754"/>
+      </p:ext>
+    </p:extLst>
+  </p:cSld>
+  <p:clrMapOvr>
+    <a:masterClrMapping/>
+  </p:clrMapOvr>
+</p:sld>
+</file>
+
+<file path=ppt/slides/slide3.xml><?xml version="1.0" encoding="utf-8"?>
 <p:sld xmlns:a="http://schemas.openxmlformats.org/drawingml/2006/main" xmlns:r="http://schemas.openxmlformats.org/officeDocument/2006/relationships" xmlns:p="http://schemas.openxmlformats.org/presentationml/2006/main">
   <p:cSld>
     <p:spTree>
@@ -6265,7 +6377,7 @@
 </p:sld>
 </file>
 
-<file path=ppt/slides/slide3.xml><?xml version="1.0" encoding="utf-8"?>
+<file path=ppt/slides/slide4.xml><?xml version="1.0" encoding="utf-8"?>
 <p:sld xmlns:a="http://schemas.openxmlformats.org/drawingml/2006/main" xmlns:r="http://schemas.openxmlformats.org/officeDocument/2006/relationships" xmlns:p="http://schemas.openxmlformats.org/presentationml/2006/main">
   <p:cSld>
     <p:spTree>
@@ -6371,7 +6483,7 @@
 </p:sld>
 </file>
 
-<file path=ppt/slides/slide4.xml><?xml version="1.0" encoding="utf-8"?>
+<file path=ppt/slides/slide5.xml><?xml version="1.0" encoding="utf-8"?>
 <p:sld xmlns:a="http://schemas.openxmlformats.org/drawingml/2006/main" xmlns:r="http://schemas.openxmlformats.org/officeDocument/2006/relationships" xmlns:p="http://schemas.openxmlformats.org/presentationml/2006/main">
   <p:cSld>
     <p:spTree>
@@ -6490,7 +6602,7 @@
 </p:sld>
 </file>
 
-<file path=ppt/slides/slide5.xml><?xml version="1.0" encoding="utf-8"?>
+<file path=ppt/slides/slide6.xml><?xml version="1.0" encoding="utf-8"?>
 <p:sld xmlns:a="http://schemas.openxmlformats.org/drawingml/2006/main" xmlns:r="http://schemas.openxmlformats.org/officeDocument/2006/relationships" xmlns:p="http://schemas.openxmlformats.org/presentationml/2006/main">
   <p:cSld>
     <p:spTree>
@@ -6572,6 +6684,323 @@
     <p:extLst>
       <p:ext uri="{BB962C8B-B14F-4D97-AF65-F5344CB8AC3E}">
         <p14:creationId xmlns:p14="http://schemas.microsoft.com/office/powerpoint/2010/main" val="2823304637"/>
+      </p:ext>
+    </p:extLst>
+  </p:cSld>
+  <p:clrMapOvr>
+    <a:masterClrMapping/>
+  </p:clrMapOvr>
+</p:sld>
+</file>
+
+<file path=ppt/slides/slide7.xml><?xml version="1.0" encoding="utf-8"?>
+<p:sld xmlns:a="http://schemas.openxmlformats.org/drawingml/2006/main" xmlns:r="http://schemas.openxmlformats.org/officeDocument/2006/relationships" xmlns:p="http://schemas.openxmlformats.org/presentationml/2006/main">
+  <p:cSld>
+    <p:spTree>
+      <p:nvGrpSpPr>
+        <p:cNvPr id="1" name=""/>
+        <p:cNvGrpSpPr/>
+        <p:nvPr/>
+      </p:nvGrpSpPr>
+      <p:grpSpPr>
+        <a:xfrm>
+          <a:off x="0" y="0"/>
+          <a:ext cx="0" cy="0"/>
+          <a:chOff x="0" y="0"/>
+          <a:chExt cx="0" cy="0"/>
+        </a:xfrm>
+      </p:grpSpPr>
+      <p:sp>
+        <p:nvSpPr>
+          <p:cNvPr id="2" name="Titre 1">
+            <a:extLst>
+              <a:ext uri="{FF2B5EF4-FFF2-40B4-BE49-F238E27FC236}">
+                <a16:creationId xmlns:a16="http://schemas.microsoft.com/office/drawing/2014/main" id="{6A20F6DD-23BA-06DD-E286-0B3A5A9B5696}"/>
+              </a:ext>
+            </a:extLst>
+          </p:cNvPr>
+          <p:cNvSpPr>
+            <a:spLocks noGrp="1"/>
+          </p:cNvSpPr>
+          <p:nvPr>
+            <p:ph type="title"/>
+          </p:nvPr>
+        </p:nvSpPr>
+        <p:spPr/>
+        <p:txBody>
+          <a:bodyPr/>
+          <a:lstStyle/>
+          <a:p>
+            <a:r>
+              <a:rPr lang="fr-FR" dirty="0"/>
+              <a:t>Positifs / Négatifs</a:t>
+            </a:r>
+            <a:endParaRPr lang="fr-NC" dirty="0"/>
+          </a:p>
+        </p:txBody>
+      </p:sp>
+      <p:sp>
+        <p:nvSpPr>
+          <p:cNvPr id="3" name="Espace réservé du contenu 2">
+            <a:extLst>
+              <a:ext uri="{FF2B5EF4-FFF2-40B4-BE49-F238E27FC236}">
+                <a16:creationId xmlns:a16="http://schemas.microsoft.com/office/drawing/2014/main" id="{51F835BF-4BDF-3EC8-6D4C-D360E2764423}"/>
+              </a:ext>
+            </a:extLst>
+          </p:cNvPr>
+          <p:cNvSpPr>
+            <a:spLocks noGrp="1"/>
+          </p:cNvSpPr>
+          <p:nvPr>
+            <p:ph idx="1"/>
+          </p:nvPr>
+        </p:nvSpPr>
+        <p:spPr/>
+        <p:txBody>
+          <a:bodyPr/>
+          <a:lstStyle/>
+          <a:p>
+            <a:r>
+              <a:rPr lang="fr-FR" u="sng" dirty="0"/>
+              <a:t>Positifs :</a:t>
+            </a:r>
+          </a:p>
+          <a:p>
+            <a:pPr lvl="1"/>
+            <a:r>
+              <a:rPr lang="fr-FR" dirty="0"/>
+              <a:t>Simplicité du code</a:t>
+            </a:r>
+          </a:p>
+          <a:p>
+            <a:pPr lvl="1"/>
+            <a:r>
+              <a:rPr lang="fr-FR" dirty="0"/>
+              <a:t>Pas de duplication</a:t>
+            </a:r>
+          </a:p>
+          <a:p>
+            <a:r>
+              <a:rPr lang="fr-FR" u="sng" dirty="0"/>
+              <a:t>Négatifs :</a:t>
+            </a:r>
+          </a:p>
+          <a:p>
+            <a:pPr lvl="1"/>
+            <a:r>
+              <a:rPr lang="fr-FR" dirty="0"/>
+              <a:t>+ de fichiers</a:t>
+            </a:r>
+          </a:p>
+          <a:p>
+            <a:pPr lvl="1"/>
+            <a:endParaRPr lang="fr-FR" dirty="0"/>
+          </a:p>
+          <a:p>
+            <a:endParaRPr lang="fr-FR" dirty="0"/>
+          </a:p>
+          <a:p>
+            <a:pPr lvl="1"/>
+            <a:endParaRPr lang="fr-FR" dirty="0"/>
+          </a:p>
+        </p:txBody>
+      </p:sp>
+    </p:spTree>
+    <p:extLst>
+      <p:ext uri="{BB962C8B-B14F-4D97-AF65-F5344CB8AC3E}">
+        <p14:creationId xmlns:p14="http://schemas.microsoft.com/office/powerpoint/2010/main" val="4165329565"/>
+      </p:ext>
+    </p:extLst>
+  </p:cSld>
+  <p:clrMapOvr>
+    <a:masterClrMapping/>
+  </p:clrMapOvr>
+</p:sld>
+</file>
+
+<file path=ppt/slides/slide8.xml><?xml version="1.0" encoding="utf-8"?>
+<p:sld xmlns:a="http://schemas.openxmlformats.org/drawingml/2006/main" xmlns:r="http://schemas.openxmlformats.org/officeDocument/2006/relationships" xmlns:p="http://schemas.openxmlformats.org/presentationml/2006/main">
+  <p:cSld>
+    <p:spTree>
+      <p:nvGrpSpPr>
+        <p:cNvPr id="1" name=""/>
+        <p:cNvGrpSpPr/>
+        <p:nvPr/>
+      </p:nvGrpSpPr>
+      <p:grpSpPr>
+        <a:xfrm>
+          <a:off x="0" y="0"/>
+          <a:ext cx="0" cy="0"/>
+          <a:chOff x="0" y="0"/>
+          <a:chExt cx="0" cy="0"/>
+        </a:xfrm>
+      </p:grpSpPr>
+      <p:sp>
+        <p:nvSpPr>
+          <p:cNvPr id="2" name="Titre 1">
+            <a:extLst>
+              <a:ext uri="{FF2B5EF4-FFF2-40B4-BE49-F238E27FC236}">
+                <a16:creationId xmlns:a16="http://schemas.microsoft.com/office/drawing/2014/main" id="{B99030D0-A7D8-CCB7-554B-40F1D1AA3511}"/>
+              </a:ext>
+            </a:extLst>
+          </p:cNvPr>
+          <p:cNvSpPr>
+            <a:spLocks noGrp="1"/>
+          </p:cNvSpPr>
+          <p:nvPr>
+            <p:ph type="title"/>
+          </p:nvPr>
+        </p:nvSpPr>
+        <p:spPr/>
+        <p:txBody>
+          <a:bodyPr/>
+          <a:lstStyle/>
+          <a:p>
+            <a:r>
+              <a:rPr lang="fr-FR" dirty="0"/>
+              <a:t>CONCLUSION PATTERNS</a:t>
+            </a:r>
+            <a:endParaRPr lang="fr-NC" dirty="0"/>
+          </a:p>
+        </p:txBody>
+      </p:sp>
+      <p:sp>
+        <p:nvSpPr>
+          <p:cNvPr id="3" name="Espace réservé du contenu 2">
+            <a:extLst>
+              <a:ext uri="{FF2B5EF4-FFF2-40B4-BE49-F238E27FC236}">
+                <a16:creationId xmlns:a16="http://schemas.microsoft.com/office/drawing/2014/main" id="{537DE1DF-7941-5E1B-DFBC-5EAA55D5C9AB}"/>
+              </a:ext>
+            </a:extLst>
+          </p:cNvPr>
+          <p:cNvSpPr>
+            <a:spLocks noGrp="1"/>
+          </p:cNvSpPr>
+          <p:nvPr>
+            <p:ph idx="1"/>
+          </p:nvPr>
+        </p:nvSpPr>
+        <p:spPr/>
+        <p:txBody>
+          <a:bodyPr/>
+          <a:lstStyle/>
+          <a:p>
+            <a:r>
+              <a:rPr lang="fr-FR" dirty="0"/>
+              <a:t>Grâce aux patterns, le code est + lisible et + facilement maintenable/améliorable.</a:t>
+            </a:r>
+          </a:p>
+          <a:p>
+            <a:r>
+              <a:rPr lang="fr-FR" dirty="0"/>
+              <a:t>Avec ces patterns, les possibilités d’ajouter des affichages ou des états de commandes différents deviennent illimitées.</a:t>
+            </a:r>
+          </a:p>
+          <a:p>
+            <a:endParaRPr lang="fr-NC" dirty="0"/>
+          </a:p>
+        </p:txBody>
+      </p:sp>
+    </p:spTree>
+    <p:extLst>
+      <p:ext uri="{BB962C8B-B14F-4D97-AF65-F5344CB8AC3E}">
+        <p14:creationId xmlns:p14="http://schemas.microsoft.com/office/powerpoint/2010/main" val="3041941616"/>
+      </p:ext>
+    </p:extLst>
+  </p:cSld>
+  <p:clrMapOvr>
+    <a:masterClrMapping/>
+  </p:clrMapOvr>
+</p:sld>
+</file>
+
+<file path=ppt/slides/slide9.xml><?xml version="1.0" encoding="utf-8"?>
+<p:sld xmlns:a="http://schemas.openxmlformats.org/drawingml/2006/main" xmlns:r="http://schemas.openxmlformats.org/officeDocument/2006/relationships" xmlns:p="http://schemas.openxmlformats.org/presentationml/2006/main">
+  <p:cSld>
+    <p:spTree>
+      <p:nvGrpSpPr>
+        <p:cNvPr id="1" name=""/>
+        <p:cNvGrpSpPr/>
+        <p:nvPr/>
+      </p:nvGrpSpPr>
+      <p:grpSpPr>
+        <a:xfrm>
+          <a:off x="0" y="0"/>
+          <a:ext cx="0" cy="0"/>
+          <a:chOff x="0" y="0"/>
+          <a:chExt cx="0" cy="0"/>
+        </a:xfrm>
+      </p:grpSpPr>
+      <p:sp>
+        <p:nvSpPr>
+          <p:cNvPr id="2" name="Titre 1">
+            <a:extLst>
+              <a:ext uri="{FF2B5EF4-FFF2-40B4-BE49-F238E27FC236}">
+                <a16:creationId xmlns:a16="http://schemas.microsoft.com/office/drawing/2014/main" id="{004CF4BE-D2CD-FC91-E010-DDD7AD257FFC}"/>
+              </a:ext>
+            </a:extLst>
+          </p:cNvPr>
+          <p:cNvSpPr>
+            <a:spLocks noGrp="1"/>
+          </p:cNvSpPr>
+          <p:nvPr>
+            <p:ph type="title"/>
+          </p:nvPr>
+        </p:nvSpPr>
+        <p:spPr/>
+        <p:txBody>
+          <a:bodyPr/>
+          <a:lstStyle/>
+          <a:p>
+            <a:r>
+              <a:rPr lang="fr-FR" dirty="0"/>
+              <a:t>CONCLUSION SEMESTRE</a:t>
+            </a:r>
+            <a:endParaRPr lang="fr-NC" dirty="0"/>
+          </a:p>
+        </p:txBody>
+      </p:sp>
+      <p:sp>
+        <p:nvSpPr>
+          <p:cNvPr id="3" name="Espace réservé du contenu 2">
+            <a:extLst>
+              <a:ext uri="{FF2B5EF4-FFF2-40B4-BE49-F238E27FC236}">
+                <a16:creationId xmlns:a16="http://schemas.microsoft.com/office/drawing/2014/main" id="{A26B3CAE-2AE0-C225-9F78-F5DEE52F4522}"/>
+              </a:ext>
+            </a:extLst>
+          </p:cNvPr>
+          <p:cNvSpPr>
+            <a:spLocks noGrp="1"/>
+          </p:cNvSpPr>
+          <p:nvPr>
+            <p:ph idx="1"/>
+          </p:nvPr>
+        </p:nvSpPr>
+        <p:spPr/>
+        <p:txBody>
+          <a:bodyPr/>
+          <a:lstStyle/>
+          <a:p>
+            <a:r>
+              <a:rPr lang="fr-FR" dirty="0"/>
+              <a:t>On a vu de nouvelles façons de coder à travers les designs patterns, nous permettant d’éviter de faire des algorithmes trop longs et trop complexes. Malgré le nombre de fichiers en plus à créer, les designs patterns nous permettent de mieux nous y retrouver et ainsi coder plus vite, et parfois </a:t>
+            </a:r>
+            <a:r>
+              <a:rPr lang="fr-FR"/>
+              <a:t>même augmentent les </a:t>
+            </a:r>
+            <a:r>
+              <a:rPr lang="fr-FR" dirty="0"/>
+              <a:t>performances des programmes.</a:t>
+            </a:r>
+            <a:endParaRPr lang="fr-NC" dirty="0"/>
+          </a:p>
+        </p:txBody>
+      </p:sp>
+    </p:spTree>
+    <p:extLst>
+      <p:ext uri="{BB962C8B-B14F-4D97-AF65-F5344CB8AC3E}">
+        <p14:creationId xmlns:p14="http://schemas.microsoft.com/office/powerpoint/2010/main" val="2731208726"/>
       </p:ext>
     </p:extLst>
   </p:cSld>

</xml_diff>